<commit_message>
tdf#125181 Add shapes star24 and star32 to unit test
The commit a7695c9455d9e4fc0f25c8d04c423b1713169750 has fixed the error
in the definition of shapes star24 and star32. They can now be
included in the test file for unit test of preset shape handles.

Change-Id: I94f63d37a7faaec4006104127fcc0443304ae0b8
Reviewed-on: https://gerrit.libreoffice.org/72612
Tested-by: Jenkins
Reviewed-by: Regina Henschel <rb.henschel@t-online.de>
</commit_message>
<xml_diff>
--- a/svx/qa/unit/data/tdf115813_HandleMovementOOXMLPresetShapes.pptx
+++ b/svx/qa/unit/data/tdf115813_HandleMovementOOXMLPresetShapes.pptx
@@ -208,7 +208,7 @@
           <a:p>
             <a:fld id="{9B113631-7145-4E41-8E0C-5E299EFCE9F7}" type="datetimeFigureOut">
               <a:rPr lang="en-US" smtClean="0"/>
-              <a:t>13-May-19</a:t>
+              <a:t>19-May-19</a:t>
             </a:fld>
             <a:endParaRPr lang="en-US"/>
           </a:p>
@@ -7055,6 +7055,123 @@
           <a:p>
             <a:pPr algn="ctr"/>
             <a:endParaRPr lang="en-US"/>
+          </a:p>
+        </p:txBody>
+      </p:sp>
+      <p:sp>
+        <p:nvSpPr>
+          <p:cNvPr id="3" name="Star: 24 Points 2">
+            <a:extLst>
+              <a:ext uri="{FF2B5EF4-FFF2-40B4-BE49-F238E27FC236}">
+                <a16:creationId xmlns:a16="http://schemas.microsoft.com/office/drawing/2014/main" id="{7FC705B5-3C78-48C1-A2BC-04D5A9B4AE37}"/>
+              </a:ext>
+            </a:extLst>
+          </p:cNvPr>
+          <p:cNvSpPr/>
+          <p:nvPr/>
+        </p:nvSpPr>
+        <p:spPr>
+          <a:xfrm>
+            <a:off x="15840000" y="16560000"/>
+            <a:ext cx="1439280" cy="1799640"/>
+          </a:xfrm>
+          <a:prstGeom prst="star24">
+            <a:avLst>
+              <a:gd name="adj" fmla="val 26426"/>
+            </a:avLst>
+          </a:prstGeom>
+          <a:solidFill>
+            <a:srgbClr val="FFEFCF"/>
+          </a:solidFill>
+          <a:ln>
+            <a:solidFill>
+              <a:srgbClr val="0000FF"/>
+            </a:solidFill>
+          </a:ln>
+        </p:spPr>
+        <p:style>
+          <a:lnRef idx="2">
+            <a:schemeClr val="accent1">
+              <a:shade val="50000"/>
+            </a:schemeClr>
+          </a:lnRef>
+          <a:fillRef idx="1">
+            <a:schemeClr val="accent1"/>
+          </a:fillRef>
+          <a:effectRef idx="0">
+            <a:schemeClr val="accent1"/>
+          </a:effectRef>
+          <a:fontRef idx="minor"/>
+        </p:style>
+        <p:txBody>
+          <a:bodyPr rtlCol="0" anchor="ctr"/>
+          <a:lstStyle/>
+          <a:p>
+            <a:pPr algn="ctr"/>
+            <a:endParaRPr lang="en-US"/>
+          </a:p>
+        </p:txBody>
+      </p:sp>
+      <p:sp>
+        <p:nvSpPr>
+          <p:cNvPr id="4" name="Star: 32 Points 3">
+            <a:extLst>
+              <a:ext uri="{FF2B5EF4-FFF2-40B4-BE49-F238E27FC236}">
+                <a16:creationId xmlns:a16="http://schemas.microsoft.com/office/drawing/2014/main" id="{9C5A9A0B-DC0B-43EE-A153-F7BE59EEBEB3}"/>
+              </a:ext>
+            </a:extLst>
+          </p:cNvPr>
+          <p:cNvSpPr/>
+          <p:nvPr/>
+        </p:nvSpPr>
+        <p:spPr>
+          <a:xfrm>
+            <a:off x="17999280" y="16559640"/>
+            <a:ext cx="1439280" cy="1799640"/>
+          </a:xfrm>
+          <a:prstGeom prst="star32">
+            <a:avLst>
+              <a:gd name="adj" fmla="val 27403"/>
+            </a:avLst>
+          </a:prstGeom>
+          <a:solidFill>
+            <a:srgbClr val="FFEFCF"/>
+          </a:solidFill>
+          <a:ln>
+            <a:solidFill>
+              <a:srgbClr val="0000FF"/>
+            </a:solidFill>
+          </a:ln>
+        </p:spPr>
+        <p:style>
+          <a:lnRef idx="2">
+            <a:schemeClr val="accent1">
+              <a:shade val="50000"/>
+            </a:schemeClr>
+          </a:lnRef>
+          <a:fillRef idx="1">
+            <a:schemeClr val="accent1"/>
+          </a:fillRef>
+          <a:effectRef idx="0">
+            <a:schemeClr val="accent1"/>
+          </a:effectRef>
+          <a:fontRef idx="minor"/>
+        </p:style>
+        <p:txBody>
+          <a:bodyPr rot="0" spcFirstLastPara="0" vertOverflow="overflow" horzOverflow="overflow" vert="horz" wrap="square" lIns="91440" tIns="45720" rIns="91440" bIns="45720" numCol="1" spcCol="0" rtlCol="0" fromWordArt="0" anchor="ctr" anchorCtr="0" forceAA="0" compatLnSpc="1">
+            <a:prstTxWarp prst="textNoShape">
+              <a:avLst/>
+            </a:prstTxWarp>
+            <a:noAutofit/>
+          </a:bodyPr>
+          <a:lstStyle/>
+          <a:p>
+            <a:pPr algn="ctr"/>
+            <a:endParaRPr lang="en-US">
+              <a:solidFill>
+                <a:schemeClr val="tx1"/>
+              </a:solidFill>
+            </a:endParaRPr>
           </a:p>
         </p:txBody>
       </p:sp>

</xml_diff>